<commit_message>
General edits on shell presentations and added my name
</commit_message>
<xml_diff>
--- a/shell/presentations/01_editors.pptx
+++ b/shell/presentations/01_editors.pptx
@@ -545,7 +545,7 @@
             <a:fld id="{646265C4-D3EB-4033-9F2F-7AE1FCA20C43}" type="datetimeFigureOut">
               <a:rPr lang="en-GB" smtClean="0"/>
               <a:pPr/>
-              <a:t>03/10/2018</a:t>
+              <a:t>12/10/2018</a:t>
             </a:fld>
             <a:endParaRPr lang="en-GB" dirty="0"/>
           </a:p>
@@ -772,7 +772,7 @@
             <a:fld id="{646265C4-D3EB-4033-9F2F-7AE1FCA20C43}" type="datetimeFigureOut">
               <a:rPr lang="en-GB" smtClean="0"/>
               <a:pPr/>
-              <a:t>03/10/2018</a:t>
+              <a:t>12/10/2018</a:t>
             </a:fld>
             <a:endParaRPr lang="en-GB" dirty="0"/>
           </a:p>
@@ -5019,11 +5019,7 @@
           <a:p>
             <a:r>
               <a:rPr lang="en-US" dirty="0" smtClean="0"/>
-              <a:t>The </a:t>
-            </a:r>
-            <a:r>
-              <a:rPr lang="en-US" smtClean="0"/>
-              <a:t>Unix Shell</a:t>
+              <a:t>The Unix Shell</a:t>
             </a:r>
             <a:endParaRPr lang="en-US" dirty="0"/>
           </a:p>
@@ -5048,7 +5044,6 @@
               <a:rPr lang="en-US" dirty="0"/>
               <a:t>Text Editors and Terminals</a:t>
             </a:r>
-            <a:endParaRPr lang="en-US" dirty="0"/>
           </a:p>
         </p:txBody>
       </p:sp>
@@ -5122,14 +5117,23 @@
           <a:p>
             <a:r>
               <a:rPr lang="en-US" dirty="0" smtClean="0"/>
-              <a:t>An text editor is a program used to edit text!</a:t>
+              <a:t>A text editor is a program used to edit text!</a:t>
             </a:r>
           </a:p>
           <a:p>
             <a:r>
               <a:rPr lang="en-US" dirty="0" smtClean="0"/>
-              <a:t>There are lots of them, but they all manipulate a stream of characters so you can save them in a file.</a:t>
-            </a:r>
+              <a:t>There are lots of them, but they all manipulate a stream of characters so you can save them in </a:t>
+            </a:r>
+            <a:r>
+              <a:rPr lang="en-US" smtClean="0"/>
+              <a:t>a </a:t>
+            </a:r>
+            <a:r>
+              <a:rPr lang="en-US" smtClean="0"/>
+              <a:t>file</a:t>
+            </a:r>
+            <a:endParaRPr lang="en-US" dirty="0" smtClean="0"/>
           </a:p>
           <a:p>
             <a:r>

</xml_diff>

<commit_message>
fixed up tools presentation and tidy
</commit_message>
<xml_diff>
--- a/shell/presentations/01_editors.pptx
+++ b/shell/presentations/01_editors.pptx
@@ -545,7 +545,7 @@
             <a:fld id="{646265C4-D3EB-4033-9F2F-7AE1FCA20C43}" type="datetimeFigureOut">
               <a:rPr lang="en-GB" smtClean="0"/>
               <a:pPr/>
-              <a:t>12/10/2018</a:t>
+              <a:t>17/11/2021</a:t>
             </a:fld>
             <a:endParaRPr lang="en-GB" dirty="0"/>
           </a:p>
@@ -588,7 +588,7 @@
           </a:lstStyle>
           <a:p>
             <a:r>
-              <a:rPr lang="en-US" smtClean="0"/>
+              <a:rPr lang="en-US"/>
               <a:t>Click icon to add picture</a:t>
             </a:r>
             <a:endParaRPr lang="en-GB" dirty="0"/>
@@ -772,7 +772,7 @@
             <a:fld id="{646265C4-D3EB-4033-9F2F-7AE1FCA20C43}" type="datetimeFigureOut">
               <a:rPr lang="en-GB" smtClean="0"/>
               <a:pPr/>
-              <a:t>12/10/2018</a:t>
+              <a:t>17/11/2021</a:t>
             </a:fld>
             <a:endParaRPr lang="en-GB" dirty="0"/>
           </a:p>
@@ -815,7 +815,7 @@
           </a:lstStyle>
           <a:p>
             <a:r>
-              <a:rPr lang="en-US" smtClean="0"/>
+              <a:rPr lang="en-US"/>
               <a:t>Click icon to add picture</a:t>
             </a:r>
             <a:endParaRPr lang="en-GB" dirty="0"/>
@@ -962,7 +962,7 @@
           </a:lstStyle>
           <a:p>
             <a:r>
-              <a:rPr lang="en-US" smtClean="0"/>
+              <a:rPr lang="en-US"/>
               <a:t>Click icon to add picture</a:t>
             </a:r>
             <a:endParaRPr lang="en-GB" dirty="0"/>
@@ -4285,7 +4285,7 @@
           <a:lstStyle/>
           <a:p>
             <a:r>
-              <a:rPr lang="en-GB" dirty="0" smtClean="0"/>
+              <a:rPr lang="en-GB" dirty="0"/>
               <a:t>Click to edit </a:t>
             </a:r>
             <a:endParaRPr lang="en-US" dirty="0"/>
@@ -4309,35 +4309,35 @@
           <a:p>
             <a:pPr lvl="0"/>
             <a:r>
-              <a:rPr lang="en-GB" dirty="0" smtClean="0"/>
+              <a:rPr lang="en-GB" dirty="0"/>
               <a:t>Master text styles</a:t>
             </a:r>
           </a:p>
           <a:p>
             <a:pPr lvl="1"/>
             <a:r>
-              <a:rPr lang="en-GB" dirty="0" smtClean="0"/>
+              <a:rPr lang="en-GB" dirty="0"/>
               <a:t>Second level</a:t>
             </a:r>
           </a:p>
           <a:p>
             <a:pPr lvl="2"/>
             <a:r>
-              <a:rPr lang="en-GB" dirty="0" smtClean="0"/>
+              <a:rPr lang="en-GB" dirty="0"/>
               <a:t>Third level</a:t>
             </a:r>
           </a:p>
           <a:p>
             <a:pPr lvl="3"/>
             <a:r>
-              <a:rPr lang="en-GB" dirty="0" smtClean="0"/>
+              <a:rPr lang="en-GB" dirty="0"/>
               <a:t>Fourth level</a:t>
             </a:r>
           </a:p>
           <a:p>
             <a:pPr lvl="4"/>
             <a:r>
-              <a:rPr lang="en-GB" dirty="0" smtClean="0"/>
+              <a:rPr lang="en-GB" dirty="0"/>
               <a:t>Fifth level</a:t>
             </a:r>
             <a:endParaRPr lang="en-US" dirty="0"/>
@@ -4678,7 +4678,7 @@
           <a:lstStyle/>
           <a:p>
             <a:r>
-              <a:rPr lang="en-US" smtClean="0"/>
+              <a:rPr lang="en-US"/>
               <a:t>Click to edit Master title style</a:t>
             </a:r>
             <a:endParaRPr lang="en-GB" dirty="0"/>
@@ -5018,10 +5018,9 @@
           <a:lstStyle/>
           <a:p>
             <a:r>
-              <a:rPr lang="en-US" dirty="0" smtClean="0"/>
+              <a:rPr lang="en-US" dirty="0"/>
               <a:t>The Unix Shell</a:t>
             </a:r>
-            <a:endParaRPr lang="en-US" dirty="0"/>
           </a:p>
         </p:txBody>
       </p:sp>
@@ -5042,7 +5041,7 @@
           <a:p>
             <a:r>
               <a:rPr lang="en-US" dirty="0"/>
-              <a:t>Text Editors and Terminals</a:t>
+              <a:t>Tools</a:t>
             </a:r>
           </a:p>
         </p:txBody>
@@ -5116,49 +5115,35 @@
           <a:lstStyle/>
           <a:p>
             <a:r>
-              <a:rPr lang="en-US" dirty="0" smtClean="0"/>
+              <a:rPr lang="en-US" dirty="0"/>
               <a:t>A text editor is a program used to edit text!</a:t>
             </a:r>
           </a:p>
           <a:p>
             <a:r>
-              <a:rPr lang="en-US" dirty="0" smtClean="0"/>
-              <a:t>There are lots of them, but they all manipulate a stream of characters so you can save them in </a:t>
-            </a:r>
-            <a:r>
-              <a:rPr lang="en-US" smtClean="0"/>
-              <a:t>a </a:t>
-            </a:r>
-            <a:r>
-              <a:rPr lang="en-US" smtClean="0"/>
-              <a:t>file</a:t>
-            </a:r>
-            <a:endParaRPr lang="en-US" dirty="0" smtClean="0"/>
+              <a:rPr lang="en-US" dirty="0"/>
+              <a:t>There are lots of them, but they all manipulate a stream of characters so you can save them in a file</a:t>
+            </a:r>
           </a:p>
           <a:p>
             <a:r>
-              <a:rPr lang="en-US" dirty="0" smtClean="0"/>
+              <a:rPr lang="en-US" dirty="0"/>
               <a:t>Some editors use a window – </a:t>
             </a:r>
             <a:r>
-              <a:rPr lang="en-US" dirty="0" err="1" smtClean="0"/>
+              <a:rPr lang="en-US" dirty="0" err="1"/>
               <a:t>gedit</a:t>
             </a:r>
             <a:r>
-              <a:rPr lang="en-US" dirty="0" smtClean="0"/>
+              <a:rPr lang="en-US" dirty="0"/>
               <a:t>, notepad</a:t>
             </a:r>
           </a:p>
           <a:p>
             <a:r>
-              <a:rPr lang="en-US" dirty="0" smtClean="0"/>
-              <a:t>Others just use the terminal window – vi, </a:t>
-            </a:r>
-            <a:r>
-              <a:rPr lang="en-US" dirty="0" err="1" smtClean="0"/>
-              <a:t>emacs</a:t>
-            </a:r>
-            <a:endParaRPr lang="en-US" dirty="0"/>
+              <a:rPr lang="en-US" dirty="0"/>
+              <a:t>Others just use the terminal window – vi, emacs, nano</a:t>
+            </a:r>
           </a:p>
         </p:txBody>
       </p:sp>
@@ -5209,11 +5194,7 @@
           <a:p>
             <a:r>
               <a:rPr lang="en-US" dirty="0"/>
-              <a:t>Today we will be using </a:t>
-            </a:r>
-            <a:r>
-              <a:rPr lang="en-US" dirty="0" err="1"/>
-              <a:t>gedit</a:t>
+              <a:t>nano</a:t>
             </a:r>
             <a:endParaRPr lang="en-GB" dirty="0"/>
           </a:p>
@@ -5221,25 +5202,69 @@
       </p:sp>
       <p:pic>
         <p:nvPicPr>
-          <p:cNvPr id="4" name="Content Placeholder 3"/>
+          <p:cNvPr id="3" name="Picture 2" descr="Graphical user interface, text, application&#10;&#10;Description automatically generated">
+            <a:extLst>
+              <a:ext uri="{FF2B5EF4-FFF2-40B4-BE49-F238E27FC236}">
+                <a16:creationId xmlns:a16="http://schemas.microsoft.com/office/drawing/2014/main" id="{5754F420-3E5B-7348-B3B3-9DA350003115}"/>
+              </a:ext>
+            </a:extLst>
+          </p:cNvPr>
           <p:cNvPicPr>
-            <a:picLocks noGrp="1" noChangeAspect="1"/>
+            <a:picLocks noChangeAspect="1"/>
           </p:cNvPicPr>
-          <p:nvPr>
-            <p:ph idx="1"/>
-          </p:nvPr>
+          <p:nvPr/>
         </p:nvPicPr>
-        <p:blipFill rotWithShape="1">
+        <p:blipFill>
           <a:blip r:embed="rId2"/>
-          <a:stretch/>
+          <a:stretch>
+            <a:fillRect/>
+          </a:stretch>
         </p:blipFill>
         <p:spPr>
           <a:xfrm>
-            <a:off x="1521557" y="1374775"/>
-            <a:ext cx="6127873" cy="4351338"/>
+            <a:off x="1309263" y="1177159"/>
+            <a:ext cx="6920338" cy="3972292"/>
           </a:xfrm>
+          <a:prstGeom prst="rect">
+            <a:avLst/>
+          </a:prstGeom>
         </p:spPr>
       </p:pic>
+      <p:sp>
+        <p:nvSpPr>
+          <p:cNvPr id="8" name="TextBox 7">
+            <a:extLst>
+              <a:ext uri="{FF2B5EF4-FFF2-40B4-BE49-F238E27FC236}">
+                <a16:creationId xmlns:a16="http://schemas.microsoft.com/office/drawing/2014/main" id="{5649390B-D40F-7147-A7A4-3150B535B861}"/>
+              </a:ext>
+            </a:extLst>
+          </p:cNvPr>
+          <p:cNvSpPr txBox="1"/>
+          <p:nvPr/>
+        </p:nvSpPr>
+        <p:spPr>
+          <a:xfrm>
+            <a:off x="1219200" y="5402317"/>
+            <a:ext cx="5595571" cy="369332"/>
+          </a:xfrm>
+          <a:prstGeom prst="rect">
+            <a:avLst/>
+          </a:prstGeom>
+          <a:noFill/>
+        </p:spPr>
+        <p:txBody>
+          <a:bodyPr wrap="none" rtlCol="0">
+            <a:spAutoFit/>
+          </a:bodyPr>
+          <a:lstStyle/>
+          <a:p>
+            <a:r>
+              <a:rPr lang="en-US" dirty="0"/>
+              <a:t>Happy for you to use emacs or vi if you already know how.</a:t>
+            </a:r>
+          </a:p>
+        </p:txBody>
+      </p:sp>
     </p:spTree>
     <p:extLst>
       <p:ext uri="{BB962C8B-B14F-4D97-AF65-F5344CB8AC3E}">
@@ -5286,10 +5311,9 @@
           <a:lstStyle/>
           <a:p>
             <a:r>
-              <a:rPr lang="en-US" dirty="0" smtClean="0"/>
+              <a:rPr lang="en-US" dirty="0"/>
               <a:t>What is a terminal</a:t>
             </a:r>
-            <a:endParaRPr lang="en-US" dirty="0"/>
           </a:p>
         </p:txBody>
       </p:sp>
@@ -5311,13 +5335,13 @@
           <a:lstStyle/>
           <a:p>
             <a:r>
-              <a:rPr lang="en-US" dirty="0" smtClean="0"/>
+              <a:rPr lang="en-US" dirty="0"/>
               <a:t>A terminal is a program used to talk to a shell</a:t>
             </a:r>
           </a:p>
           <a:p>
             <a:r>
-              <a:rPr lang="en-US" dirty="0" smtClean="0"/>
+              <a:rPr lang="en-US" dirty="0"/>
               <a:t>We will be learning what a shell is later…</a:t>
             </a:r>
           </a:p>
@@ -5369,10 +5393,17 @@
           <a:lstStyle/>
           <a:p>
             <a:r>
-              <a:rPr lang="en-US" dirty="0" smtClean="0"/>
-              <a:t>Today we will be using term</a:t>
-            </a:r>
-            <a:endParaRPr lang="en-US" dirty="0"/>
+              <a:rPr lang="en-US" dirty="0"/>
+              <a:t>Today we will be using </a:t>
+            </a:r>
+            <a:r>
+              <a:rPr lang="en-US" dirty="0" err="1"/>
+              <a:t>Moboxterm</a:t>
+            </a:r>
+            <a:r>
+              <a:rPr lang="en-US" dirty="0"/>
+              <a:t> or Terminal</a:t>
+            </a:r>
           </a:p>
         </p:txBody>
       </p:sp>
@@ -5399,11 +5430,46 @@
         </p:blipFill>
         <p:spPr>
           <a:xfrm>
-            <a:off x="326635" y="1623941"/>
+            <a:off x="349624" y="1261294"/>
             <a:ext cx="8229600" cy="4525963"/>
           </a:xfrm>
         </p:spPr>
       </p:pic>
+      <p:sp>
+        <p:nvSpPr>
+          <p:cNvPr id="5" name="TextBox 4">
+            <a:extLst>
+              <a:ext uri="{FF2B5EF4-FFF2-40B4-BE49-F238E27FC236}">
+                <a16:creationId xmlns:a16="http://schemas.microsoft.com/office/drawing/2014/main" id="{74E7B70F-CA98-BD4E-AE94-850F85FB00F5}"/>
+              </a:ext>
+            </a:extLst>
+          </p:cNvPr>
+          <p:cNvSpPr txBox="1"/>
+          <p:nvPr/>
+        </p:nvSpPr>
+        <p:spPr>
+          <a:xfrm>
+            <a:off x="244366" y="1070743"/>
+            <a:ext cx="4650826" cy="369332"/>
+          </a:xfrm>
+          <a:prstGeom prst="rect">
+            <a:avLst/>
+          </a:prstGeom>
+          <a:noFill/>
+        </p:spPr>
+        <p:txBody>
+          <a:bodyPr wrap="square">
+            <a:spAutoFit/>
+          </a:bodyPr>
+          <a:lstStyle/>
+          <a:p>
+            <a:r>
+              <a:rPr lang="en-US" dirty="0"/>
+              <a:t>Does not matter which one.</a:t>
+            </a:r>
+          </a:p>
+        </p:txBody>
+      </p:sp>
     </p:spTree>
     <p:extLst>
       <p:ext uri="{BB962C8B-B14F-4D97-AF65-F5344CB8AC3E}">
@@ -5450,10 +5516,9 @@
           <a:lstStyle/>
           <a:p>
             <a:r>
-              <a:rPr lang="en-US" dirty="0" smtClean="0"/>
+              <a:rPr lang="en-US" dirty="0"/>
               <a:t>Web browser</a:t>
             </a:r>
-            <a:endParaRPr lang="en-US" dirty="0"/>
           </a:p>
         </p:txBody>
       </p:sp>
@@ -5473,7 +5538,7 @@
           <a:lstStyle/>
           <a:p>
             <a:r>
-              <a:rPr lang="en-US" dirty="0" smtClean="0"/>
+              <a:rPr lang="en-US" dirty="0"/>
               <a:t>Does not matter which one.</a:t>
             </a:r>
           </a:p>
@@ -5558,10 +5623,9 @@
           <a:lstStyle/>
           <a:p>
             <a:r>
-              <a:rPr lang="en-US" dirty="0" smtClean="0"/>
+              <a:rPr lang="en-US" dirty="0"/>
               <a:t>Shell Day 1</a:t>
             </a:r>
-            <a:endParaRPr lang="en-US" dirty="0"/>
           </a:p>
         </p:txBody>
       </p:sp>
@@ -5575,14 +5639,14 @@
             <p:ph idx="1"/>
             <p:extLst>
               <p:ext uri="{D42A27DB-BD31-4B8C-83A1-F6EECF244321}">
-                <p14:modId xmlns:p14="http://schemas.microsoft.com/office/powerpoint/2010/main" val="1933555247"/>
+                <p14:modId xmlns:p14="http://schemas.microsoft.com/office/powerpoint/2010/main" val="3999115109"/>
               </p:ext>
             </p:extLst>
           </p:nvPr>
         </p:nvGraphicFramePr>
         <p:xfrm>
           <a:off x="-1" y="1240077"/>
-          <a:ext cx="9144002" cy="5617922"/>
+          <a:ext cx="9144002" cy="4482635"/>
         </p:xfrm>
         <a:graphic>
           <a:graphicData uri="http://schemas.openxmlformats.org/drawingml/2006/table">
@@ -5668,7 +5732,10 @@
                       <a:tailEnd type="none" w="med" len="med"/>
                     </a:lnB>
                     <a:solidFill>
-                      <a:srgbClr val="FFF2CC"/>
+                      <a:schemeClr val="accent1">
+                        <a:lumMod val="40000"/>
+                        <a:lumOff val="60000"/>
+                      </a:schemeClr>
                     </a:solidFill>
                   </a:tcPr>
                 </a:tc>
@@ -5728,7 +5795,10 @@
                       <a:tailEnd type="none" w="med" len="med"/>
                     </a:lnB>
                     <a:solidFill>
-                      <a:srgbClr val="FFF2CC"/>
+                      <a:schemeClr val="accent1">
+                        <a:lumMod val="40000"/>
+                        <a:lumOff val="60000"/>
+                      </a:schemeClr>
                     </a:solidFill>
                   </a:tcPr>
                 </a:tc>
@@ -5739,7 +5809,7 @@
                     <a:p>
                       <a:pPr rtl="0" fontAlgn="b"/>
                       <a:r>
-                        <a:rPr lang="en-US" sz="1800" b="0">
+                        <a:rPr lang="en-US" sz="1800" b="0" dirty="0">
                           <a:solidFill>
                             <a:srgbClr val="000000"/>
                           </a:solidFill>
@@ -5788,7 +5858,10 @@
                       <a:tailEnd type="none" w="med" len="med"/>
                     </a:lnB>
                     <a:solidFill>
-                      <a:srgbClr val="FFF2CC"/>
+                      <a:schemeClr val="accent1">
+                        <a:lumMod val="40000"/>
+                        <a:lumOff val="60000"/>
+                      </a:schemeClr>
                     </a:solidFill>
                   </a:tcPr>
                 </a:tc>
@@ -5806,14 +5879,14 @@
                     <a:p>
                       <a:pPr algn="r" rtl="0" fontAlgn="b"/>
                       <a:r>
-                        <a:rPr lang="is-IS" sz="1800" b="0">
+                        <a:rPr lang="is-IS" sz="1800" b="0" dirty="0">
                           <a:solidFill>
                             <a:srgbClr val="000000"/>
                           </a:solidFill>
                           <a:effectLst/>
                           <a:latin typeface="Calibri" charset="0"/>
                         </a:rPr>
-                        <a:t>00:05</a:t>
+                        <a:t>00:30</a:t>
                       </a:r>
                     </a:p>
                   </a:txBody>
@@ -5855,7 +5928,7 @@
                       <a:tailEnd type="none" w="med" len="med"/>
                     </a:lnB>
                     <a:solidFill>
-                      <a:srgbClr val="CFE2F3"/>
+                      <a:srgbClr val="FFF2CC"/>
                     </a:solidFill>
                   </a:tcPr>
                 </a:tc>
@@ -5873,134 +5946,7 @@
                           <a:effectLst/>
                           <a:latin typeface="Calibri" charset="0"/>
                         </a:rPr>
-                        <a:t>Make sure everyone is happy</a:t>
-                      </a:r>
-                    </a:p>
-                  </a:txBody>
-                  <a:tcPr marL="19050" marR="19050" marT="12700" marB="12700" anchor="b">
-                    <a:lnL w="6350" cap="flat" cmpd="sng" algn="ctr">
-                      <a:solidFill>
-                        <a:srgbClr val="CCCCCC"/>
-                      </a:solidFill>
-                      <a:prstDash val="solid"/>
-                      <a:round/>
-                      <a:headEnd type="none" w="med" len="med"/>
-                      <a:tailEnd type="none" w="med" len="med"/>
-                    </a:lnL>
-                    <a:lnR w="6350" cap="flat" cmpd="sng" algn="ctr">
-                      <a:solidFill>
-                        <a:srgbClr val="CCCCCC"/>
-                      </a:solidFill>
-                      <a:prstDash val="solid"/>
-                      <a:round/>
-                      <a:headEnd type="none" w="med" len="med"/>
-                      <a:tailEnd type="none" w="med" len="med"/>
-                    </a:lnR>
-                    <a:lnT w="6350" cap="flat" cmpd="sng" algn="ctr">
-                      <a:solidFill>
-                        <a:srgbClr val="CCCCCC"/>
-                      </a:solidFill>
-                      <a:prstDash val="solid"/>
-                      <a:round/>
-                      <a:headEnd type="none" w="med" len="med"/>
-                      <a:tailEnd type="none" w="med" len="med"/>
-                    </a:lnT>
-                    <a:lnB w="6350" cap="flat" cmpd="sng" algn="ctr">
-                      <a:solidFill>
-                        <a:srgbClr val="CCCCCC"/>
-                      </a:solidFill>
-                      <a:prstDash val="solid"/>
-                      <a:round/>
-                      <a:headEnd type="none" w="med" len="med"/>
-                      <a:tailEnd type="none" w="med" len="med"/>
-                    </a:lnB>
-                    <a:solidFill>
-                      <a:srgbClr val="CFE2F3"/>
-                    </a:solidFill>
-                  </a:tcPr>
-                </a:tc>
-                <a:tc>
-                  <a:txBody>
-                    <a:bodyPr/>
-                    <a:lstStyle/>
-                    <a:p>
-                      <a:pPr rtl="0" fontAlgn="b"/>
-                      <a:r>
-                        <a:rPr lang="en-US" sz="1800" b="0">
-                          <a:solidFill>
-                            <a:srgbClr val="000000"/>
-                          </a:solidFill>
-                          <a:effectLst/>
-                          <a:latin typeface="Calibri" charset="0"/>
-                        </a:rPr>
-                        <a:t>setup</a:t>
-                      </a:r>
-                    </a:p>
-                  </a:txBody>
-                  <a:tcPr marL="19050" marR="19050" marT="12700" marB="12700" anchor="b">
-                    <a:lnL w="6350" cap="flat" cmpd="sng" algn="ctr">
-                      <a:solidFill>
-                        <a:srgbClr val="CCCCCC"/>
-                      </a:solidFill>
-                      <a:prstDash val="solid"/>
-                      <a:round/>
-                      <a:headEnd type="none" w="med" len="med"/>
-                      <a:tailEnd type="none" w="med" len="med"/>
-                    </a:lnL>
-                    <a:lnR w="6350" cap="flat" cmpd="sng" algn="ctr">
-                      <a:solidFill>
-                        <a:srgbClr val="CCCCCC"/>
-                      </a:solidFill>
-                      <a:prstDash val="solid"/>
-                      <a:round/>
-                      <a:headEnd type="none" w="med" len="med"/>
-                      <a:tailEnd type="none" w="med" len="med"/>
-                    </a:lnR>
-                    <a:lnT w="6350" cap="flat" cmpd="sng" algn="ctr">
-                      <a:solidFill>
-                        <a:srgbClr val="CCCCCC"/>
-                      </a:solidFill>
-                      <a:prstDash val="solid"/>
-                      <a:round/>
-                      <a:headEnd type="none" w="med" len="med"/>
-                      <a:tailEnd type="none" w="med" len="med"/>
-                    </a:lnT>
-                    <a:lnB w="6350" cap="flat" cmpd="sng" algn="ctr">
-                      <a:solidFill>
-                        <a:srgbClr val="CCCCCC"/>
-                      </a:solidFill>
-                      <a:prstDash val="solid"/>
-                      <a:round/>
-                      <a:headEnd type="none" w="med" len="med"/>
-                      <a:tailEnd type="none" w="med" len="med"/>
-                    </a:lnB>
-                    <a:solidFill>
-                      <a:srgbClr val="CFE2F3"/>
-                    </a:solidFill>
-                  </a:tcPr>
-                </a:tc>
-                <a:extLst>
-                  <a:ext uri="{0D108BD9-81ED-4DB2-BD59-A6C34878D82A}">
-                    <a16:rowId xmlns:a16="http://schemas.microsoft.com/office/drawing/2014/main" val="10001"/>
-                  </a:ext>
-                </a:extLst>
-              </a:tr>
-              <a:tr h="363878">
-                <a:tc>
-                  <a:txBody>
-                    <a:bodyPr/>
-                    <a:lstStyle/>
-                    <a:p>
-                      <a:pPr algn="r" rtl="0" fontAlgn="b"/>
-                      <a:r>
-                        <a:rPr lang="is-IS" sz="1800" b="0">
-                          <a:solidFill>
-                            <a:srgbClr val="000000"/>
-                          </a:solidFill>
-                          <a:effectLst/>
-                          <a:latin typeface="Calibri" charset="0"/>
-                        </a:rPr>
-                        <a:t>00:05</a:t>
+                        <a:t>Unix shell intro, Files and directories</a:t>
                       </a:r>
                     </a:p>
                   </a:txBody>
@@ -6053,441 +5999,7 @@
                     <a:p>
                       <a:pPr rtl="0" fontAlgn="b"/>
                       <a:r>
-                        <a:rPr lang="en-US" sz="1800" b="0">
-                          <a:solidFill>
-                            <a:srgbClr val="000000"/>
-                          </a:solidFill>
-                          <a:effectLst/>
-                          <a:latin typeface="Calibri" charset="0"/>
-                        </a:rPr>
-                        <a:t>intro to git</a:t>
-                      </a:r>
-                    </a:p>
-                  </a:txBody>
-                  <a:tcPr marL="19050" marR="19050" marT="12700" marB="12700" anchor="b">
-                    <a:lnL w="6350" cap="flat" cmpd="sng" algn="ctr">
-                      <a:solidFill>
-                        <a:srgbClr val="CCCCCC"/>
-                      </a:solidFill>
-                      <a:prstDash val="solid"/>
-                      <a:round/>
-                      <a:headEnd type="none" w="med" len="med"/>
-                      <a:tailEnd type="none" w="med" len="med"/>
-                    </a:lnL>
-                    <a:lnR w="6350" cap="flat" cmpd="sng" algn="ctr">
-                      <a:solidFill>
-                        <a:srgbClr val="CCCCCC"/>
-                      </a:solidFill>
-                      <a:prstDash val="solid"/>
-                      <a:round/>
-                      <a:headEnd type="none" w="med" len="med"/>
-                      <a:tailEnd type="none" w="med" len="med"/>
-                    </a:lnR>
-                    <a:lnT w="6350" cap="flat" cmpd="sng" algn="ctr">
-                      <a:solidFill>
-                        <a:srgbClr val="CCCCCC"/>
-                      </a:solidFill>
-                      <a:prstDash val="solid"/>
-                      <a:round/>
-                      <a:headEnd type="none" w="med" len="med"/>
-                      <a:tailEnd type="none" w="med" len="med"/>
-                    </a:lnT>
-                    <a:lnB w="6350" cap="flat" cmpd="sng" algn="ctr">
-                      <a:solidFill>
-                        <a:srgbClr val="CCCCCC"/>
-                      </a:solidFill>
-                      <a:prstDash val="solid"/>
-                      <a:round/>
-                      <a:headEnd type="none" w="med" len="med"/>
-                      <a:tailEnd type="none" w="med" len="med"/>
-                    </a:lnB>
-                    <a:solidFill>
-                      <a:srgbClr val="FFF2CC"/>
-                    </a:solidFill>
-                  </a:tcPr>
-                </a:tc>
-                <a:tc>
-                  <a:txBody>
-                    <a:bodyPr/>
-                    <a:lstStyle/>
-                    <a:p>
-                      <a:pPr rtl="0" fontAlgn="b"/>
-                      <a:r>
-                        <a:rPr lang="en-US" sz="1800" b="0">
-                          <a:solidFill>
-                            <a:srgbClr val="000000"/>
-                          </a:solidFill>
-                          <a:effectLst/>
-                          <a:latin typeface="Calibri" charset="0"/>
-                        </a:rPr>
-                        <a:t>presentation</a:t>
-                      </a:r>
-                    </a:p>
-                  </a:txBody>
-                  <a:tcPr marL="19050" marR="19050" marT="12700" marB="12700" anchor="b">
-                    <a:lnL w="6350" cap="flat" cmpd="sng" algn="ctr">
-                      <a:solidFill>
-                        <a:srgbClr val="CCCCCC"/>
-                      </a:solidFill>
-                      <a:prstDash val="solid"/>
-                      <a:round/>
-                      <a:headEnd type="none" w="med" len="med"/>
-                      <a:tailEnd type="none" w="med" len="med"/>
-                    </a:lnL>
-                    <a:lnR w="6350" cap="flat" cmpd="sng" algn="ctr">
-                      <a:solidFill>
-                        <a:srgbClr val="CCCCCC"/>
-                      </a:solidFill>
-                      <a:prstDash val="solid"/>
-                      <a:round/>
-                      <a:headEnd type="none" w="med" len="med"/>
-                      <a:tailEnd type="none" w="med" len="med"/>
-                    </a:lnR>
-                    <a:lnT w="6350" cap="flat" cmpd="sng" algn="ctr">
-                      <a:solidFill>
-                        <a:srgbClr val="CCCCCC"/>
-                      </a:solidFill>
-                      <a:prstDash val="solid"/>
-                      <a:round/>
-                      <a:headEnd type="none" w="med" len="med"/>
-                      <a:tailEnd type="none" w="med" len="med"/>
-                    </a:lnT>
-                    <a:lnB w="6350" cap="flat" cmpd="sng" algn="ctr">
-                      <a:solidFill>
-                        <a:srgbClr val="CCCCCC"/>
-                      </a:solidFill>
-                      <a:prstDash val="solid"/>
-                      <a:round/>
-                      <a:headEnd type="none" w="med" len="med"/>
-                      <a:tailEnd type="none" w="med" len="med"/>
-                    </a:lnB>
-                    <a:solidFill>
-                      <a:srgbClr val="FFF2CC"/>
-                    </a:solidFill>
-                  </a:tcPr>
-                </a:tc>
-                <a:extLst>
-                  <a:ext uri="{0D108BD9-81ED-4DB2-BD59-A6C34878D82A}">
-                    <a16:rowId xmlns:a16="http://schemas.microsoft.com/office/drawing/2014/main" val="10002"/>
-                  </a:ext>
-                </a:extLst>
-              </a:tr>
-              <a:tr h="363878">
-                <a:tc>
-                  <a:txBody>
-                    <a:bodyPr/>
-                    <a:lstStyle/>
-                    <a:p>
-                      <a:pPr algn="r" rtl="0" fontAlgn="b"/>
-                      <a:r>
-                        <a:rPr lang="is-IS" sz="1800" b="0">
-                          <a:solidFill>
-                            <a:srgbClr val="000000"/>
-                          </a:solidFill>
-                          <a:effectLst/>
-                          <a:latin typeface="Calibri" charset="0"/>
-                        </a:rPr>
-                        <a:t>00:10</a:t>
-                      </a:r>
-                    </a:p>
-                  </a:txBody>
-                  <a:tcPr marL="19050" marR="19050" marT="12700" marB="12700" anchor="b">
-                    <a:lnL w="6350" cap="flat" cmpd="sng" algn="ctr">
-                      <a:solidFill>
-                        <a:srgbClr val="CCCCCC"/>
-                      </a:solidFill>
-                      <a:prstDash val="solid"/>
-                      <a:round/>
-                      <a:headEnd type="none" w="med" len="med"/>
-                      <a:tailEnd type="none" w="med" len="med"/>
-                    </a:lnL>
-                    <a:lnR w="6350" cap="flat" cmpd="sng" algn="ctr">
-                      <a:solidFill>
-                        <a:srgbClr val="CCCCCC"/>
-                      </a:solidFill>
-                      <a:prstDash val="solid"/>
-                      <a:round/>
-                      <a:headEnd type="none" w="med" len="med"/>
-                      <a:tailEnd type="none" w="med" len="med"/>
-                    </a:lnR>
-                    <a:lnT w="6350" cap="flat" cmpd="sng" algn="ctr">
-                      <a:solidFill>
-                        <a:srgbClr val="CCCCCC"/>
-                      </a:solidFill>
-                      <a:prstDash val="solid"/>
-                      <a:round/>
-                      <a:headEnd type="none" w="med" len="med"/>
-                      <a:tailEnd type="none" w="med" len="med"/>
-                    </a:lnT>
-                    <a:lnB w="6350" cap="flat" cmpd="sng" algn="ctr">
-                      <a:solidFill>
-                        <a:srgbClr val="CCCCCC"/>
-                      </a:solidFill>
-                      <a:prstDash val="solid"/>
-                      <a:round/>
-                      <a:headEnd type="none" w="med" len="med"/>
-                      <a:tailEnd type="none" w="med" len="med"/>
-                    </a:lnB>
-                    <a:solidFill>
-                      <a:srgbClr val="CFE2F3"/>
-                    </a:solidFill>
-                  </a:tcPr>
-                </a:tc>
-                <a:tc>
-                  <a:txBody>
-                    <a:bodyPr/>
-                    <a:lstStyle/>
-                    <a:p>
-                      <a:pPr rtl="0" fontAlgn="b"/>
-                      <a:r>
-                        <a:rPr lang="en-US" sz="1800" b="0">
-                          <a:solidFill>
-                            <a:srgbClr val="000000"/>
-                          </a:solidFill>
-                          <a:effectLst/>
-                          <a:latin typeface="Calibri" charset="0"/>
-                        </a:rPr>
-                        <a:t>Github sign up</a:t>
-                      </a:r>
-                    </a:p>
-                  </a:txBody>
-                  <a:tcPr marL="19050" marR="19050" marT="12700" marB="12700" anchor="b">
-                    <a:lnL w="6350" cap="flat" cmpd="sng" algn="ctr">
-                      <a:solidFill>
-                        <a:srgbClr val="CCCCCC"/>
-                      </a:solidFill>
-                      <a:prstDash val="solid"/>
-                      <a:round/>
-                      <a:headEnd type="none" w="med" len="med"/>
-                      <a:tailEnd type="none" w="med" len="med"/>
-                    </a:lnL>
-                    <a:lnR w="6350" cap="flat" cmpd="sng" algn="ctr">
-                      <a:solidFill>
-                        <a:srgbClr val="CCCCCC"/>
-                      </a:solidFill>
-                      <a:prstDash val="solid"/>
-                      <a:round/>
-                      <a:headEnd type="none" w="med" len="med"/>
-                      <a:tailEnd type="none" w="med" len="med"/>
-                    </a:lnR>
-                    <a:lnT w="6350" cap="flat" cmpd="sng" algn="ctr">
-                      <a:solidFill>
-                        <a:srgbClr val="CCCCCC"/>
-                      </a:solidFill>
-                      <a:prstDash val="solid"/>
-                      <a:round/>
-                      <a:headEnd type="none" w="med" len="med"/>
-                      <a:tailEnd type="none" w="med" len="med"/>
-                    </a:lnT>
-                    <a:lnB w="6350" cap="flat" cmpd="sng" algn="ctr">
-                      <a:solidFill>
-                        <a:srgbClr val="CCCCCC"/>
-                      </a:solidFill>
-                      <a:prstDash val="solid"/>
-                      <a:round/>
-                      <a:headEnd type="none" w="med" len="med"/>
-                      <a:tailEnd type="none" w="med" len="med"/>
-                    </a:lnB>
-                    <a:solidFill>
-                      <a:srgbClr val="CFE2F3"/>
-                    </a:solidFill>
-                  </a:tcPr>
-                </a:tc>
-                <a:tc>
-                  <a:txBody>
-                    <a:bodyPr/>
-                    <a:lstStyle/>
-                    <a:p>
-                      <a:pPr rtl="0" fontAlgn="b"/>
-                      <a:r>
-                        <a:rPr lang="en-US" sz="1800" b="0">
-                          <a:solidFill>
-                            <a:srgbClr val="000000"/>
-                          </a:solidFill>
-                          <a:effectLst/>
-                          <a:latin typeface="Calibri" charset="0"/>
-                        </a:rPr>
-                        <a:t>setup</a:t>
-                      </a:r>
-                    </a:p>
-                  </a:txBody>
-                  <a:tcPr marL="19050" marR="19050" marT="12700" marB="12700" anchor="b">
-                    <a:lnL w="6350" cap="flat" cmpd="sng" algn="ctr">
-                      <a:solidFill>
-                        <a:srgbClr val="CCCCCC"/>
-                      </a:solidFill>
-                      <a:prstDash val="solid"/>
-                      <a:round/>
-                      <a:headEnd type="none" w="med" len="med"/>
-                      <a:tailEnd type="none" w="med" len="med"/>
-                    </a:lnL>
-                    <a:lnR w="6350" cap="flat" cmpd="sng" algn="ctr">
-                      <a:solidFill>
-                        <a:srgbClr val="CCCCCC"/>
-                      </a:solidFill>
-                      <a:prstDash val="solid"/>
-                      <a:round/>
-                      <a:headEnd type="none" w="med" len="med"/>
-                      <a:tailEnd type="none" w="med" len="med"/>
-                    </a:lnR>
-                    <a:lnT w="6350" cap="flat" cmpd="sng" algn="ctr">
-                      <a:solidFill>
-                        <a:srgbClr val="CCCCCC"/>
-                      </a:solidFill>
-                      <a:prstDash val="solid"/>
-                      <a:round/>
-                      <a:headEnd type="none" w="med" len="med"/>
-                      <a:tailEnd type="none" w="med" len="med"/>
-                    </a:lnT>
-                    <a:lnB w="6350" cap="flat" cmpd="sng" algn="ctr">
-                      <a:solidFill>
-                        <a:srgbClr val="CCCCCC"/>
-                      </a:solidFill>
-                      <a:prstDash val="solid"/>
-                      <a:round/>
-                      <a:headEnd type="none" w="med" len="med"/>
-                      <a:tailEnd type="none" w="med" len="med"/>
-                    </a:lnB>
-                    <a:solidFill>
-                      <a:srgbClr val="CFE2F3"/>
-                    </a:solidFill>
-                  </a:tcPr>
-                </a:tc>
-                <a:extLst>
-                  <a:ext uri="{0D108BD9-81ED-4DB2-BD59-A6C34878D82A}">
-                    <a16:rowId xmlns:a16="http://schemas.microsoft.com/office/drawing/2014/main" val="10003"/>
-                  </a:ext>
-                </a:extLst>
-              </a:tr>
-              <a:tr h="363878">
-                <a:tc>
-                  <a:txBody>
-                    <a:bodyPr/>
-                    <a:lstStyle/>
-                    <a:p>
-                      <a:pPr algn="r" rtl="0" fontAlgn="b"/>
-                      <a:r>
-                        <a:rPr lang="is-IS" sz="1800" b="0">
-                          <a:solidFill>
-                            <a:srgbClr val="000000"/>
-                          </a:solidFill>
-                          <a:effectLst/>
-                          <a:latin typeface="Calibri" charset="0"/>
-                        </a:rPr>
-                        <a:t>00:30</a:t>
-                      </a:r>
-                    </a:p>
-                  </a:txBody>
-                  <a:tcPr marL="19050" marR="19050" marT="12700" marB="12700" anchor="b">
-                    <a:lnL w="6350" cap="flat" cmpd="sng" algn="ctr">
-                      <a:solidFill>
-                        <a:srgbClr val="CCCCCC"/>
-                      </a:solidFill>
-                      <a:prstDash val="solid"/>
-                      <a:round/>
-                      <a:headEnd type="none" w="med" len="med"/>
-                      <a:tailEnd type="none" w="med" len="med"/>
-                    </a:lnL>
-                    <a:lnR w="6350" cap="flat" cmpd="sng" algn="ctr">
-                      <a:solidFill>
-                        <a:srgbClr val="CCCCCC"/>
-                      </a:solidFill>
-                      <a:prstDash val="solid"/>
-                      <a:round/>
-                      <a:headEnd type="none" w="med" len="med"/>
-                      <a:tailEnd type="none" w="med" len="med"/>
-                    </a:lnR>
-                    <a:lnT w="6350" cap="flat" cmpd="sng" algn="ctr">
-                      <a:solidFill>
-                        <a:srgbClr val="CCCCCC"/>
-                      </a:solidFill>
-                      <a:prstDash val="solid"/>
-                      <a:round/>
-                      <a:headEnd type="none" w="med" len="med"/>
-                      <a:tailEnd type="none" w="med" len="med"/>
-                    </a:lnT>
-                    <a:lnB w="6350" cap="flat" cmpd="sng" algn="ctr">
-                      <a:solidFill>
-                        <a:srgbClr val="CCCCCC"/>
-                      </a:solidFill>
-                      <a:prstDash val="solid"/>
-                      <a:round/>
-                      <a:headEnd type="none" w="med" len="med"/>
-                      <a:tailEnd type="none" w="med" len="med"/>
-                    </a:lnB>
-                    <a:solidFill>
-                      <a:srgbClr val="FFF2CC"/>
-                    </a:solidFill>
-                  </a:tcPr>
-                </a:tc>
-                <a:tc>
-                  <a:txBody>
-                    <a:bodyPr/>
-                    <a:lstStyle/>
-                    <a:p>
-                      <a:pPr rtl="0" fontAlgn="b"/>
-                      <a:r>
-                        <a:rPr lang="en-US" sz="1800" b="0">
-                          <a:solidFill>
-                            <a:srgbClr val="000000"/>
-                          </a:solidFill>
-                          <a:effectLst/>
-                          <a:latin typeface="Calibri" charset="0"/>
-                        </a:rPr>
-                        <a:t>Unix shell intro, Files and directories</a:t>
-                      </a:r>
-                    </a:p>
-                  </a:txBody>
-                  <a:tcPr marL="19050" marR="19050" marT="12700" marB="12700" anchor="b">
-                    <a:lnL w="6350" cap="flat" cmpd="sng" algn="ctr">
-                      <a:solidFill>
-                        <a:srgbClr val="CCCCCC"/>
-                      </a:solidFill>
-                      <a:prstDash val="solid"/>
-                      <a:round/>
-                      <a:headEnd type="none" w="med" len="med"/>
-                      <a:tailEnd type="none" w="med" len="med"/>
-                    </a:lnL>
-                    <a:lnR w="6350" cap="flat" cmpd="sng" algn="ctr">
-                      <a:solidFill>
-                        <a:srgbClr val="CCCCCC"/>
-                      </a:solidFill>
-                      <a:prstDash val="solid"/>
-                      <a:round/>
-                      <a:headEnd type="none" w="med" len="med"/>
-                      <a:tailEnd type="none" w="med" len="med"/>
-                    </a:lnR>
-                    <a:lnT w="6350" cap="flat" cmpd="sng" algn="ctr">
-                      <a:solidFill>
-                        <a:srgbClr val="CCCCCC"/>
-                      </a:solidFill>
-                      <a:prstDash val="solid"/>
-                      <a:round/>
-                      <a:headEnd type="none" w="med" len="med"/>
-                      <a:tailEnd type="none" w="med" len="med"/>
-                    </a:lnT>
-                    <a:lnB w="6350" cap="flat" cmpd="sng" algn="ctr">
-                      <a:solidFill>
-                        <a:srgbClr val="CCCCCC"/>
-                      </a:solidFill>
-                      <a:prstDash val="solid"/>
-                      <a:round/>
-                      <a:headEnd type="none" w="med" len="med"/>
-                      <a:tailEnd type="none" w="med" len="med"/>
-                    </a:lnB>
-                    <a:solidFill>
-                      <a:srgbClr val="FFF2CC"/>
-                    </a:solidFill>
-                  </a:tcPr>
-                </a:tc>
-                <a:tc>
-                  <a:txBody>
-                    <a:bodyPr/>
-                    <a:lstStyle/>
-                    <a:p>
-                      <a:pPr rtl="0" fontAlgn="b"/>
-                      <a:r>
-                        <a:rPr lang="en-US" sz="1800" b="0">
+                        <a:rPr lang="en-US" sz="1800" b="0" dirty="0">
                           <a:solidFill>
                             <a:srgbClr val="000000"/>
                           </a:solidFill>
@@ -6614,7 +6126,7 @@
                     <a:p>
                       <a:pPr rtl="0" fontAlgn="b"/>
                       <a:r>
-                        <a:rPr lang="en-US" sz="1800" b="0">
+                        <a:rPr lang="en-US" sz="1800" b="0" dirty="0">
                           <a:solidFill>
                             <a:srgbClr val="000000"/>
                           </a:solidFill>
@@ -7481,7 +6993,7 @@
                   </a:ext>
                 </a:extLst>
               </a:tr>
-              <a:tr h="523630">
+              <a:tr h="479977">
                 <a:tc>
                   <a:txBody>
                     <a:bodyPr/>
@@ -7549,7 +7061,7 @@
                     <a:p>
                       <a:pPr rtl="0" fontAlgn="b"/>
                       <a:r>
-                        <a:rPr lang="en-US" sz="1800" b="0">
+                        <a:rPr lang="en-US" sz="1800" b="0" dirty="0">
                           <a:solidFill>
                             <a:srgbClr val="000000"/>
                           </a:solidFill>
@@ -8459,10 +7971,9 @@
           <a:lstStyle/>
           <a:p>
             <a:r>
-              <a:rPr lang="en-US" dirty="0" smtClean="0"/>
+              <a:rPr lang="en-US" dirty="0"/>
               <a:t>Shell Day 2</a:t>
             </a:r>
-            <a:endParaRPr lang="en-US" dirty="0"/>
           </a:p>
         </p:txBody>
       </p:sp>
@@ -8476,14 +7987,14 @@
             <p:ph idx="1"/>
             <p:extLst>
               <p:ext uri="{D42A27DB-BD31-4B8C-83A1-F6EECF244321}">
-                <p14:modId xmlns:p14="http://schemas.microsoft.com/office/powerpoint/2010/main" val="161564291"/>
+                <p14:modId xmlns:p14="http://schemas.microsoft.com/office/powerpoint/2010/main" val="400608087"/>
               </p:ext>
             </p:extLst>
           </p:nvPr>
         </p:nvGraphicFramePr>
         <p:xfrm>
           <a:off x="-1" y="1215030"/>
-          <a:ext cx="9144002" cy="5642969"/>
+          <a:ext cx="9144002" cy="4829747"/>
         </p:xfrm>
         <a:graphic>
           <a:graphicData uri="http://schemas.openxmlformats.org/drawingml/2006/table">
@@ -8954,14 +8465,14 @@
                     <a:p>
                       <a:pPr rtl="0" fontAlgn="b"/>
                       <a:r>
-                        <a:rPr lang="en-US" sz="2000" b="0">
+                        <a:rPr lang="en-US" sz="2000" b="0" dirty="0">
                           <a:solidFill>
                             <a:srgbClr val="000000"/>
                           </a:solidFill>
                           <a:effectLst/>
                           <a:latin typeface="Calibri" charset="0"/>
                         </a:rPr>
-                        <a:t>Git talk</a:t>
+                        <a:t>shell scripts</a:t>
                       </a:r>
                     </a:p>
                   </a:txBody>
@@ -9014,381 +8525,7 @@
                     <a:p>
                       <a:pPr rtl="0" fontAlgn="b"/>
                       <a:r>
-                        <a:rPr lang="en-US" sz="2000" b="0">
-                          <a:solidFill>
-                            <a:srgbClr val="000000"/>
-                          </a:solidFill>
-                          <a:effectLst/>
-                          <a:latin typeface="Calibri" charset="0"/>
-                        </a:rPr>
-                        <a:t>presentation</a:t>
-                      </a:r>
-                    </a:p>
-                  </a:txBody>
-                  <a:tcPr marL="19050" marR="19050" marT="12700" marB="12700" anchor="b">
-                    <a:lnL w="6350" cap="flat" cmpd="sng" algn="ctr">
-                      <a:solidFill>
-                        <a:srgbClr val="CCCCCC"/>
-                      </a:solidFill>
-                      <a:prstDash val="solid"/>
-                      <a:round/>
-                      <a:headEnd type="none" w="med" len="med"/>
-                      <a:tailEnd type="none" w="med" len="med"/>
-                    </a:lnL>
-                    <a:lnR w="6350" cap="flat" cmpd="sng" algn="ctr">
-                      <a:solidFill>
-                        <a:srgbClr val="CCCCCC"/>
-                      </a:solidFill>
-                      <a:prstDash val="solid"/>
-                      <a:round/>
-                      <a:headEnd type="none" w="med" len="med"/>
-                      <a:tailEnd type="none" w="med" len="med"/>
-                    </a:lnR>
-                    <a:lnT w="6350" cap="flat" cmpd="sng" algn="ctr">
-                      <a:solidFill>
-                        <a:srgbClr val="CCCCCC"/>
-                      </a:solidFill>
-                      <a:prstDash val="solid"/>
-                      <a:round/>
-                      <a:headEnd type="none" w="med" len="med"/>
-                      <a:tailEnd type="none" w="med" len="med"/>
-                    </a:lnT>
-                    <a:lnB w="6350" cap="flat" cmpd="sng" algn="ctr">
-                      <a:solidFill>
-                        <a:srgbClr val="CCCCCC"/>
-                      </a:solidFill>
-                      <a:prstDash val="solid"/>
-                      <a:round/>
-                      <a:headEnd type="none" w="med" len="med"/>
-                      <a:tailEnd type="none" w="med" len="med"/>
-                    </a:lnB>
-                    <a:solidFill>
-                      <a:srgbClr val="FFF2CC"/>
-                    </a:solidFill>
-                  </a:tcPr>
-                </a:tc>
-                <a:extLst>
-                  <a:ext uri="{0D108BD9-81ED-4DB2-BD59-A6C34878D82A}">
-                    <a16:rowId xmlns:a16="http://schemas.microsoft.com/office/drawing/2014/main" val="10002"/>
-                  </a:ext>
-                </a:extLst>
-              </a:tr>
-              <a:tr h="406611">
-                <a:tc>
-                  <a:txBody>
-                    <a:bodyPr/>
-                    <a:lstStyle/>
-                    <a:p>
-                      <a:pPr algn="r" rtl="0" fontAlgn="b"/>
-                      <a:r>
-                        <a:rPr lang="is-IS" sz="2000" b="0">
-                          <a:solidFill>
-                            <a:srgbClr val="000000"/>
-                          </a:solidFill>
-                          <a:effectLst/>
-                          <a:latin typeface="Calibri" charset="0"/>
-                        </a:rPr>
-                        <a:t>00:15</a:t>
-                      </a:r>
-                    </a:p>
-                  </a:txBody>
-                  <a:tcPr marL="19050" marR="19050" marT="12700" marB="12700" anchor="b">
-                    <a:lnL w="6350" cap="flat" cmpd="sng" algn="ctr">
-                      <a:solidFill>
-                        <a:srgbClr val="CCCCCC"/>
-                      </a:solidFill>
-                      <a:prstDash val="solid"/>
-                      <a:round/>
-                      <a:headEnd type="none" w="med" len="med"/>
-                      <a:tailEnd type="none" w="med" len="med"/>
-                    </a:lnL>
-                    <a:lnR w="6350" cap="flat" cmpd="sng" algn="ctr">
-                      <a:solidFill>
-                        <a:srgbClr val="CCCCCC"/>
-                      </a:solidFill>
-                      <a:prstDash val="solid"/>
-                      <a:round/>
-                      <a:headEnd type="none" w="med" len="med"/>
-                      <a:tailEnd type="none" w="med" len="med"/>
-                    </a:lnR>
-                    <a:lnT w="6350" cap="flat" cmpd="sng" algn="ctr">
-                      <a:solidFill>
-                        <a:srgbClr val="CCCCCC"/>
-                      </a:solidFill>
-                      <a:prstDash val="solid"/>
-                      <a:round/>
-                      <a:headEnd type="none" w="med" len="med"/>
-                      <a:tailEnd type="none" w="med" len="med"/>
-                    </a:lnT>
-                    <a:lnB w="6350" cap="flat" cmpd="sng" algn="ctr">
-                      <a:solidFill>
-                        <a:srgbClr val="CCCCCC"/>
-                      </a:solidFill>
-                      <a:prstDash val="solid"/>
-                      <a:round/>
-                      <a:headEnd type="none" w="med" len="med"/>
-                      <a:tailEnd type="none" w="med" len="med"/>
-                    </a:lnB>
-                    <a:solidFill>
-                      <a:srgbClr val="CFE2F3"/>
-                    </a:solidFill>
-                  </a:tcPr>
-                </a:tc>
-                <a:tc>
-                  <a:txBody>
-                    <a:bodyPr/>
-                    <a:lstStyle/>
-                    <a:p>
-                      <a:pPr rtl="0" fontAlgn="b"/>
-                      <a:r>
-                        <a:rPr lang="en-US" sz="2000" b="0">
-                          <a:solidFill>
-                            <a:srgbClr val="000000"/>
-                          </a:solidFill>
-                          <a:effectLst/>
-                          <a:latin typeface="Calibri" charset="0"/>
-                        </a:rPr>
-                        <a:t>Git exercise</a:t>
-                      </a:r>
-                    </a:p>
-                  </a:txBody>
-                  <a:tcPr marL="19050" marR="19050" marT="12700" marB="12700" anchor="b">
-                    <a:lnL w="6350" cap="flat" cmpd="sng" algn="ctr">
-                      <a:solidFill>
-                        <a:srgbClr val="CCCCCC"/>
-                      </a:solidFill>
-                      <a:prstDash val="solid"/>
-                      <a:round/>
-                      <a:headEnd type="none" w="med" len="med"/>
-                      <a:tailEnd type="none" w="med" len="med"/>
-                    </a:lnL>
-                    <a:lnR w="6350" cap="flat" cmpd="sng" algn="ctr">
-                      <a:solidFill>
-                        <a:srgbClr val="CCCCCC"/>
-                      </a:solidFill>
-                      <a:prstDash val="solid"/>
-                      <a:round/>
-                      <a:headEnd type="none" w="med" len="med"/>
-                      <a:tailEnd type="none" w="med" len="med"/>
-                    </a:lnR>
-                    <a:lnT w="6350" cap="flat" cmpd="sng" algn="ctr">
-                      <a:solidFill>
-                        <a:srgbClr val="CCCCCC"/>
-                      </a:solidFill>
-                      <a:prstDash val="solid"/>
-                      <a:round/>
-                      <a:headEnd type="none" w="med" len="med"/>
-                      <a:tailEnd type="none" w="med" len="med"/>
-                    </a:lnT>
-                    <a:lnB w="6350" cap="flat" cmpd="sng" algn="ctr">
-                      <a:solidFill>
-                        <a:srgbClr val="CCCCCC"/>
-                      </a:solidFill>
-                      <a:prstDash val="solid"/>
-                      <a:round/>
-                      <a:headEnd type="none" w="med" len="med"/>
-                      <a:tailEnd type="none" w="med" len="med"/>
-                    </a:lnB>
-                    <a:solidFill>
-                      <a:srgbClr val="CFE2F3"/>
-                    </a:solidFill>
-                  </a:tcPr>
-                </a:tc>
-                <a:tc>
-                  <a:txBody>
-                    <a:bodyPr/>
-                    <a:lstStyle/>
-                    <a:p>
-                      <a:pPr rtl="0" fontAlgn="b"/>
-                      <a:r>
-                        <a:rPr lang="en-US" sz="2000" b="0">
-                          <a:solidFill>
-                            <a:srgbClr val="000000"/>
-                          </a:solidFill>
-                          <a:effectLst/>
-                          <a:latin typeface="Calibri" charset="0"/>
-                        </a:rPr>
-                        <a:t>exercise</a:t>
-                      </a:r>
-                    </a:p>
-                  </a:txBody>
-                  <a:tcPr marL="19050" marR="19050" marT="12700" marB="12700" anchor="b">
-                    <a:lnL w="6350" cap="flat" cmpd="sng" algn="ctr">
-                      <a:solidFill>
-                        <a:srgbClr val="CCCCCC"/>
-                      </a:solidFill>
-                      <a:prstDash val="solid"/>
-                      <a:round/>
-                      <a:headEnd type="none" w="med" len="med"/>
-                      <a:tailEnd type="none" w="med" len="med"/>
-                    </a:lnL>
-                    <a:lnR w="6350" cap="flat" cmpd="sng" algn="ctr">
-                      <a:solidFill>
-                        <a:srgbClr val="CCCCCC"/>
-                      </a:solidFill>
-                      <a:prstDash val="solid"/>
-                      <a:round/>
-                      <a:headEnd type="none" w="med" len="med"/>
-                      <a:tailEnd type="none" w="med" len="med"/>
-                    </a:lnR>
-                    <a:lnT w="6350" cap="flat" cmpd="sng" algn="ctr">
-                      <a:solidFill>
-                        <a:srgbClr val="CCCCCC"/>
-                      </a:solidFill>
-                      <a:prstDash val="solid"/>
-                      <a:round/>
-                      <a:headEnd type="none" w="med" len="med"/>
-                      <a:tailEnd type="none" w="med" len="med"/>
-                    </a:lnT>
-                    <a:lnB w="6350" cap="flat" cmpd="sng" algn="ctr">
-                      <a:solidFill>
-                        <a:srgbClr val="CCCCCC"/>
-                      </a:solidFill>
-                      <a:prstDash val="solid"/>
-                      <a:round/>
-                      <a:headEnd type="none" w="med" len="med"/>
-                      <a:tailEnd type="none" w="med" len="med"/>
-                    </a:lnB>
-                    <a:solidFill>
-                      <a:srgbClr val="CFE2F3"/>
-                    </a:solidFill>
-                  </a:tcPr>
-                </a:tc>
-                <a:extLst>
-                  <a:ext uri="{0D108BD9-81ED-4DB2-BD59-A6C34878D82A}">
-                    <a16:rowId xmlns:a16="http://schemas.microsoft.com/office/drawing/2014/main" val="10003"/>
-                  </a:ext>
-                </a:extLst>
-              </a:tr>
-              <a:tr h="406611">
-                <a:tc>
-                  <a:txBody>
-                    <a:bodyPr/>
-                    <a:lstStyle/>
-                    <a:p>
-                      <a:pPr algn="r" rtl="0" fontAlgn="b"/>
-                      <a:r>
-                        <a:rPr lang="is-IS" sz="2000" b="0">
-                          <a:solidFill>
-                            <a:srgbClr val="000000"/>
-                          </a:solidFill>
-                          <a:effectLst/>
-                          <a:latin typeface="Calibri" charset="0"/>
-                        </a:rPr>
-                        <a:t>00:20</a:t>
-                      </a:r>
-                    </a:p>
-                  </a:txBody>
-                  <a:tcPr marL="19050" marR="19050" marT="12700" marB="12700" anchor="b">
-                    <a:lnL w="6350" cap="flat" cmpd="sng" algn="ctr">
-                      <a:solidFill>
-                        <a:srgbClr val="CCCCCC"/>
-                      </a:solidFill>
-                      <a:prstDash val="solid"/>
-                      <a:round/>
-                      <a:headEnd type="none" w="med" len="med"/>
-                      <a:tailEnd type="none" w="med" len="med"/>
-                    </a:lnL>
-                    <a:lnR w="6350" cap="flat" cmpd="sng" algn="ctr">
-                      <a:solidFill>
-                        <a:srgbClr val="CCCCCC"/>
-                      </a:solidFill>
-                      <a:prstDash val="solid"/>
-                      <a:round/>
-                      <a:headEnd type="none" w="med" len="med"/>
-                      <a:tailEnd type="none" w="med" len="med"/>
-                    </a:lnR>
-                    <a:lnT w="6350" cap="flat" cmpd="sng" algn="ctr">
-                      <a:solidFill>
-                        <a:srgbClr val="CCCCCC"/>
-                      </a:solidFill>
-                      <a:prstDash val="solid"/>
-                      <a:round/>
-                      <a:headEnd type="none" w="med" len="med"/>
-                      <a:tailEnd type="none" w="med" len="med"/>
-                    </a:lnT>
-                    <a:lnB w="6350" cap="flat" cmpd="sng" algn="ctr">
-                      <a:solidFill>
-                        <a:srgbClr val="CCCCCC"/>
-                      </a:solidFill>
-                      <a:prstDash val="solid"/>
-                      <a:round/>
-                      <a:headEnd type="none" w="med" len="med"/>
-                      <a:tailEnd type="none" w="med" len="med"/>
-                    </a:lnB>
-                    <a:solidFill>
-                      <a:srgbClr val="FFF2CC"/>
-                    </a:solidFill>
-                  </a:tcPr>
-                </a:tc>
-                <a:tc>
-                  <a:txBody>
-                    <a:bodyPr/>
-                    <a:lstStyle/>
-                    <a:p>
-                      <a:pPr rtl="0" fontAlgn="b"/>
-                      <a:r>
-                        <a:rPr lang="en-US" sz="2000" b="0">
-                          <a:solidFill>
-                            <a:srgbClr val="000000"/>
-                          </a:solidFill>
-                          <a:effectLst/>
-                          <a:latin typeface="Calibri" charset="0"/>
-                        </a:rPr>
-                        <a:t>shell scripts</a:t>
-                      </a:r>
-                    </a:p>
-                  </a:txBody>
-                  <a:tcPr marL="19050" marR="19050" marT="12700" marB="12700" anchor="b">
-                    <a:lnL w="6350" cap="flat" cmpd="sng" algn="ctr">
-                      <a:solidFill>
-                        <a:srgbClr val="CCCCCC"/>
-                      </a:solidFill>
-                      <a:prstDash val="solid"/>
-                      <a:round/>
-                      <a:headEnd type="none" w="med" len="med"/>
-                      <a:tailEnd type="none" w="med" len="med"/>
-                    </a:lnL>
-                    <a:lnR w="6350" cap="flat" cmpd="sng" algn="ctr">
-                      <a:solidFill>
-                        <a:srgbClr val="CCCCCC"/>
-                      </a:solidFill>
-                      <a:prstDash val="solid"/>
-                      <a:round/>
-                      <a:headEnd type="none" w="med" len="med"/>
-                      <a:tailEnd type="none" w="med" len="med"/>
-                    </a:lnR>
-                    <a:lnT w="6350" cap="flat" cmpd="sng" algn="ctr">
-                      <a:solidFill>
-                        <a:srgbClr val="CCCCCC"/>
-                      </a:solidFill>
-                      <a:prstDash val="solid"/>
-                      <a:round/>
-                      <a:headEnd type="none" w="med" len="med"/>
-                      <a:tailEnd type="none" w="med" len="med"/>
-                    </a:lnT>
-                    <a:lnB w="6350" cap="flat" cmpd="sng" algn="ctr">
-                      <a:solidFill>
-                        <a:srgbClr val="CCCCCC"/>
-                      </a:solidFill>
-                      <a:prstDash val="solid"/>
-                      <a:round/>
-                      <a:headEnd type="none" w="med" len="med"/>
-                      <a:tailEnd type="none" w="med" len="med"/>
-                    </a:lnB>
-                    <a:solidFill>
-                      <a:srgbClr val="FFF2CC"/>
-                    </a:solidFill>
-                  </a:tcPr>
-                </a:tc>
-                <a:tc>
-                  <a:txBody>
-                    <a:bodyPr/>
-                    <a:lstStyle/>
-                    <a:p>
-                      <a:pPr rtl="0" fontAlgn="b"/>
-                      <a:r>
-                        <a:rPr lang="en-US" sz="2000" b="0">
+                        <a:rPr lang="en-US" sz="2000" b="0" dirty="0">
                           <a:solidFill>
                             <a:srgbClr val="000000"/>
                           </a:solidFill>
@@ -9515,7 +8652,7 @@
                     <a:p>
                       <a:pPr rtl="0" fontAlgn="b"/>
                       <a:r>
-                        <a:rPr lang="en-US" sz="2000" b="0">
+                        <a:rPr lang="en-US" sz="2000" b="0" dirty="0">
                           <a:solidFill>
                             <a:srgbClr val="000000"/>
                           </a:solidFill>
@@ -9575,7 +8712,7 @@
                     <a:p>
                       <a:pPr rtl="0" fontAlgn="b"/>
                       <a:r>
-                        <a:rPr lang="en-US" sz="2000" b="0">
+                        <a:rPr lang="en-US" sz="2000" b="0" dirty="0">
                           <a:solidFill>
                             <a:srgbClr val="000000"/>
                           </a:solidFill>
@@ -9702,7 +8839,7 @@
                     <a:p>
                       <a:pPr rtl="0" fontAlgn="b"/>
                       <a:r>
-                        <a:rPr lang="en-US" sz="2000" b="0">
+                        <a:rPr lang="en-US" sz="2000" b="0" dirty="0">
                           <a:solidFill>
                             <a:srgbClr val="000000"/>
                           </a:solidFill>

</xml_diff>